<commit_message>
updated mapquest api key, added gitignore
</commit_message>
<xml_diff>
--- a/assets/resources/Project Presentation.pptx
+++ b/assets/resources/Project Presentation.pptx
@@ -114,6 +114,14 @@
       </a:defRPr>
     </a:lvl9pPr>
   </p:defaultTextStyle>
+  <p:extLst>
+    <p:ext uri="{EFAFB233-063F-42B5-8137-9DF3F51BA10A}">
+      <p15:sldGuideLst xmlns:p15="http://schemas.microsoft.com/office/powerpoint/2012/main"/>
+    </p:ext>
+    <p:ext uri="{2D200454-40CA-4A62-9FC3-DE9A4176ACB9}">
+      <p15:notesGuideLst xmlns:p15="http://schemas.microsoft.com/office/powerpoint/2012/main"/>
+    </p:ext>
+  </p:extLst>
 </p:presentation>
 </file>
 
@@ -199,7 +207,7 @@
           <a:p>
             <a:fld id="{880BA8F0-9BB8-434C-953C-84270D837FF7}" type="datetimeFigureOut">
               <a:rPr lang="en-US" smtClean="0"/>
-              <a:t>7/23/2023</a:t>
+              <a:t>7/24/2023</a:t>
             </a:fld>
             <a:endParaRPr lang="en-US"/>
           </a:p>
@@ -865,7 +873,7 @@
           <a:p>
             <a:fld id="{BA13EA9F-8D0E-45BC-8452-DFDEF1352356}" type="datetimeFigureOut">
               <a:rPr lang="en-US" smtClean="0"/>
-              <a:t>7/23/2023</a:t>
+              <a:t>7/24/2023</a:t>
             </a:fld>
             <a:endParaRPr lang="en-US"/>
           </a:p>
@@ -1140,7 +1148,7 @@
           <a:p>
             <a:fld id="{BA13EA9F-8D0E-45BC-8452-DFDEF1352356}" type="datetimeFigureOut">
               <a:rPr lang="en-US" smtClean="0"/>
-              <a:t>7/23/2023</a:t>
+              <a:t>7/24/2023</a:t>
             </a:fld>
             <a:endParaRPr lang="en-US"/>
           </a:p>
@@ -1334,7 +1342,7 @@
           <a:p>
             <a:fld id="{BA13EA9F-8D0E-45BC-8452-DFDEF1352356}" type="datetimeFigureOut">
               <a:rPr lang="en-US" smtClean="0"/>
-              <a:t>7/23/2023</a:t>
+              <a:t>7/24/2023</a:t>
             </a:fld>
             <a:endParaRPr lang="en-US"/>
           </a:p>
@@ -1602,7 +1610,7 @@
           <a:p>
             <a:fld id="{BA13EA9F-8D0E-45BC-8452-DFDEF1352356}" type="datetimeFigureOut">
               <a:rPr lang="en-US" smtClean="0"/>
-              <a:t>7/23/2023</a:t>
+              <a:t>7/24/2023</a:t>
             </a:fld>
             <a:endParaRPr lang="en-US"/>
           </a:p>
@@ -1934,7 +1942,7 @@
           <a:p>
             <a:fld id="{BA13EA9F-8D0E-45BC-8452-DFDEF1352356}" type="datetimeFigureOut">
               <a:rPr lang="en-US" smtClean="0"/>
-              <a:t>7/23/2023</a:t>
+              <a:t>7/24/2023</a:t>
             </a:fld>
             <a:endParaRPr lang="en-US"/>
           </a:p>
@@ -2544,7 +2552,7 @@
           <a:p>
             <a:fld id="{BA13EA9F-8D0E-45BC-8452-DFDEF1352356}" type="datetimeFigureOut">
               <a:rPr lang="en-US" smtClean="0"/>
-              <a:t>7/23/2023</a:t>
+              <a:t>7/24/2023</a:t>
             </a:fld>
             <a:endParaRPr lang="en-US"/>
           </a:p>
@@ -3391,7 +3399,7 @@
           <a:p>
             <a:fld id="{BA13EA9F-8D0E-45BC-8452-DFDEF1352356}" type="datetimeFigureOut">
               <a:rPr lang="en-US" smtClean="0"/>
-              <a:t>7/23/2023</a:t>
+              <a:t>7/24/2023</a:t>
             </a:fld>
             <a:endParaRPr lang="en-US"/>
           </a:p>
@@ -3561,7 +3569,7 @@
           <a:p>
             <a:fld id="{BA13EA9F-8D0E-45BC-8452-DFDEF1352356}" type="datetimeFigureOut">
               <a:rPr lang="en-US" smtClean="0"/>
-              <a:t>7/23/2023</a:t>
+              <a:t>7/24/2023</a:t>
             </a:fld>
             <a:endParaRPr lang="en-US"/>
           </a:p>
@@ -3741,7 +3749,7 @@
           <a:p>
             <a:fld id="{BA13EA9F-8D0E-45BC-8452-DFDEF1352356}" type="datetimeFigureOut">
               <a:rPr lang="en-US" smtClean="0"/>
-              <a:t>7/23/2023</a:t>
+              <a:t>7/24/2023</a:t>
             </a:fld>
             <a:endParaRPr lang="en-US"/>
           </a:p>
@@ -3911,7 +3919,7 @@
           <a:p>
             <a:fld id="{BA13EA9F-8D0E-45BC-8452-DFDEF1352356}" type="datetimeFigureOut">
               <a:rPr lang="en-US" smtClean="0"/>
-              <a:t>7/23/2023</a:t>
+              <a:t>7/24/2023</a:t>
             </a:fld>
             <a:endParaRPr lang="en-US"/>
           </a:p>
@@ -4155,7 +4163,7 @@
           <a:p>
             <a:fld id="{BA13EA9F-8D0E-45BC-8452-DFDEF1352356}" type="datetimeFigureOut">
               <a:rPr lang="en-US" smtClean="0"/>
-              <a:t>7/23/2023</a:t>
+              <a:t>7/24/2023</a:t>
             </a:fld>
             <a:endParaRPr lang="en-US"/>
           </a:p>
@@ -4447,7 +4455,7 @@
           <a:p>
             <a:fld id="{BA13EA9F-8D0E-45BC-8452-DFDEF1352356}" type="datetimeFigureOut">
               <a:rPr lang="en-US" smtClean="0"/>
-              <a:t>7/23/2023</a:t>
+              <a:t>7/24/2023</a:t>
             </a:fld>
             <a:endParaRPr lang="en-US"/>
           </a:p>
@@ -4885,7 +4893,7 @@
           <a:p>
             <a:fld id="{BA13EA9F-8D0E-45BC-8452-DFDEF1352356}" type="datetimeFigureOut">
               <a:rPr lang="en-US" smtClean="0"/>
-              <a:t>7/23/2023</a:t>
+              <a:t>7/24/2023</a:t>
             </a:fld>
             <a:endParaRPr lang="en-US"/>
           </a:p>
@@ -5003,7 +5011,7 @@
           <a:p>
             <a:fld id="{BA13EA9F-8D0E-45BC-8452-DFDEF1352356}" type="datetimeFigureOut">
               <a:rPr lang="en-US" smtClean="0"/>
-              <a:t>7/23/2023</a:t>
+              <a:t>7/24/2023</a:t>
             </a:fld>
             <a:endParaRPr lang="en-US"/>
           </a:p>
@@ -5098,7 +5106,7 @@
           <a:p>
             <a:fld id="{BA13EA9F-8D0E-45BC-8452-DFDEF1352356}" type="datetimeFigureOut">
               <a:rPr lang="en-US" smtClean="0"/>
-              <a:t>7/23/2023</a:t>
+              <a:t>7/24/2023</a:t>
             </a:fld>
             <a:endParaRPr lang="en-US"/>
           </a:p>
@@ -5377,7 +5385,7 @@
           <a:p>
             <a:fld id="{BA13EA9F-8D0E-45BC-8452-DFDEF1352356}" type="datetimeFigureOut">
               <a:rPr lang="en-US" smtClean="0"/>
-              <a:t>7/23/2023</a:t>
+              <a:t>7/24/2023</a:t>
             </a:fld>
             <a:endParaRPr lang="en-US"/>
           </a:p>
@@ -5652,7 +5660,7 @@
           <a:p>
             <a:fld id="{BA13EA9F-8D0E-45BC-8452-DFDEF1352356}" type="datetimeFigureOut">
               <a:rPr lang="en-US" smtClean="0"/>
-              <a:t>7/23/2023</a:t>
+              <a:t>7/24/2023</a:t>
             </a:fld>
             <a:endParaRPr lang="en-US"/>
           </a:p>
@@ -6081,7 +6089,7 @@
           <a:p>
             <a:fld id="{BA13EA9F-8D0E-45BC-8452-DFDEF1352356}" type="datetimeFigureOut">
               <a:rPr lang="en-US" smtClean="0"/>
-              <a:t>7/23/2023</a:t>
+              <a:t>7/24/2023</a:t>
             </a:fld>
             <a:endParaRPr lang="en-US"/>
           </a:p>
@@ -7152,7 +7160,7 @@
         <p:spPr/>
         <p:txBody>
           <a:bodyPr>
-            <a:normAutofit fontScale="47500" lnSpcReduction="20000"/>
+            <a:normAutofit fontScale="40000" lnSpcReduction="20000"/>
           </a:bodyPr>
           <a:lstStyle/>
           <a:p>
@@ -7226,12 +7234,8 @@
           <a:p>
             <a:pPr lvl="2"/>
             <a:r>
-              <a:rPr lang="en-US" dirty="0" err="1"/>
-              <a:t>Embeded</a:t>
-            </a:r>
-            <a:r>
-              <a:rPr lang="en-US" dirty="0"/>
-              <a:t> Map</a:t>
+              <a:rPr lang="en-US" dirty="0"/>
+              <a:t>Embedded Map</a:t>
             </a:r>
           </a:p>
           <a:p>
@@ -7264,12 +7268,15 @@
           <a:p>
             <a:pPr lvl="1"/>
             <a:r>
-              <a:rPr lang="en-US" dirty="0" err="1"/>
-              <a:t>PostMan</a:t>
-            </a:r>
-            <a:r>
-              <a:rPr lang="en-US" dirty="0"/>
-              <a:t> API</a:t>
+              <a:rPr lang="en-US" dirty="0"/>
+              <a:t>Postman API</a:t>
+            </a:r>
+          </a:p>
+          <a:p>
+            <a:pPr lvl="1"/>
+            <a:r>
+              <a:rPr lang="en-US" dirty="0"/>
+              <a:t>Live Share VS Code Extension</a:t>
             </a:r>
           </a:p>
           <a:p>
@@ -7324,7 +7331,7 @@
         <p:spPr/>
         <p:txBody>
           <a:bodyPr>
-            <a:normAutofit fontScale="47500" lnSpcReduction="20000"/>
+            <a:normAutofit fontScale="40000" lnSpcReduction="20000"/>
           </a:bodyPr>
           <a:lstStyle/>
           <a:p>
@@ -7424,6 +7431,12 @@
             <a:r>
               <a:rPr lang="en-US" dirty="0"/>
               <a:t>Help from Nikki Reese</a:t>
+            </a:r>
+          </a:p>
+          <a:p>
+            <a:r>
+              <a:rPr lang="en-US" dirty="0"/>
+              <a:t>We utilized the live share VS Code Extension to work on our code simultaneously during work sessions</a:t>
             </a:r>
           </a:p>
         </p:txBody>
@@ -7506,7 +7519,12 @@
             <p:ph type="body" idx="1"/>
           </p:nvPr>
         </p:nvSpPr>
-        <p:spPr/>
+        <p:spPr>
+          <a:xfrm>
+            <a:off x="5461305" y="2026596"/>
+            <a:ext cx="4396338" cy="576262"/>
+          </a:xfrm>
+        </p:spPr>
         <p:txBody>
           <a:bodyPr/>
           <a:lstStyle/>
@@ -7534,7 +7552,12 @@
             <p:ph sz="half" idx="2"/>
           </p:nvPr>
         </p:nvSpPr>
-        <p:spPr/>
+        <p:spPr>
+          <a:xfrm>
+            <a:off x="5654495" y="2685197"/>
+            <a:ext cx="4396339" cy="3741738"/>
+          </a:xfrm>
+        </p:spPr>
         <p:txBody>
           <a:bodyPr/>
           <a:lstStyle/>
@@ -7580,7 +7603,12 @@
             <p:ph type="body" sz="quarter" idx="3"/>
           </p:nvPr>
         </p:nvSpPr>
-        <p:spPr/>
+        <p:spPr>
+          <a:xfrm>
+            <a:off x="952133" y="2026596"/>
+            <a:ext cx="4396339" cy="576262"/>
+          </a:xfrm>
+        </p:spPr>
         <p:txBody>
           <a:bodyPr/>
           <a:lstStyle/>
@@ -7608,7 +7636,12 @@
             <p:ph sz="quarter" idx="4"/>
           </p:nvPr>
         </p:nvSpPr>
-        <p:spPr/>
+        <p:spPr>
+          <a:xfrm>
+            <a:off x="994946" y="2685197"/>
+            <a:ext cx="4396339" cy="3741738"/>
+          </a:xfrm>
+        </p:spPr>
         <p:txBody>
           <a:bodyPr/>
           <a:lstStyle/>
@@ -7633,18 +7666,13 @@
           <a:p>
             <a:r>
               <a:rPr lang="en-US" dirty="0"/>
-              <a:t>Google Map </a:t>
-            </a:r>
-            <a:r>
-              <a:rPr lang="en-US" dirty="0" err="1"/>
-              <a:t>Embeding</a:t>
-            </a:r>
-            <a:endParaRPr lang="en-US" dirty="0"/>
-          </a:p>
-          <a:p>
-            <a:r>
-              <a:rPr lang="en-US" dirty="0"/>
-              <a:t>Fuel Cost API</a:t>
+              <a:t>Google Map Embedding</a:t>
+            </a:r>
+          </a:p>
+          <a:p>
+            <a:r>
+              <a:rPr lang="en-US" dirty="0"/>
+              <a:t>Fuel Cost API </a:t>
             </a:r>
           </a:p>
         </p:txBody>

</xml_diff>